<commit_message>
add digital-logic.pptx, edit propositional-operators.pptx, tweak propositional-logic.pptx truth-tables.pptx
</commit_message>
<xml_diff>
--- a/spring15/slidesS15/propositional-logic.pptx
+++ b/spring15/slidesS15/propositional-logic.pptx
@@ -5287,6 +5287,195 @@
           </a:p>
         </p:txBody>
       </p:sp>
+      <p:sp>
+        <p:nvSpPr>
+          <p:cNvPr id="4" name="Rectangle 2"/>
+          <p:cNvSpPr txBox="1">
+            <a:spLocks noChangeArrowheads="1"/>
+          </p:cNvSpPr>
+          <p:nvPr/>
+        </p:nvSpPr>
+        <p:spPr bwMode="auto">
+          <a:xfrm>
+            <a:off x="1143000" y="304800"/>
+            <a:ext cx="8001000" cy="1219200"/>
+          </a:xfrm>
+          <a:prstGeom prst="rect">
+            <a:avLst/>
+          </a:prstGeom>
+          <a:noFill/>
+          <a:ln w="9525">
+            <a:noFill/>
+            <a:miter lim="800000"/>
+            <a:headEnd/>
+            <a:tailEnd/>
+          </a:ln>
+        </p:spPr>
+        <p:txBody>
+          <a:bodyPr vert="horz" wrap="square" lIns="91440" tIns="45720" rIns="91440" bIns="45720" numCol="1" anchor="ctr" anchorCtr="0" compatLnSpc="1">
+            <a:prstTxWarp prst="textNoShape">
+              <a:avLst/>
+            </a:prstTxWarp>
+          </a:bodyPr>
+          <a:lstStyle>
+            <a:lvl1pPr algn="l" rtl="0" eaLnBrk="0" fontAlgn="base" hangingPunct="0">
+              <a:spcBef>
+                <a:spcPct val="0"/>
+              </a:spcBef>
+              <a:spcAft>
+                <a:spcPct val="0"/>
+              </a:spcAft>
+              <a:defRPr sz="4400" b="1">
+                <a:solidFill>
+                  <a:schemeClr val="tx2"/>
+                </a:solidFill>
+                <a:latin typeface="Comic Sans MS" pitchFamily="66" charset="0"/>
+                <a:ea typeface="+mj-ea"/>
+                <a:cs typeface="+mj-cs"/>
+              </a:defRPr>
+            </a:lvl1pPr>
+            <a:lvl2pPr algn="l" rtl="0" eaLnBrk="0" fontAlgn="base" hangingPunct="0">
+              <a:spcBef>
+                <a:spcPct val="0"/>
+              </a:spcBef>
+              <a:spcAft>
+                <a:spcPct val="0"/>
+              </a:spcAft>
+              <a:defRPr sz="4400" b="1">
+                <a:solidFill>
+                  <a:schemeClr val="tx2"/>
+                </a:solidFill>
+                <a:latin typeface="Comic Sans MS" pitchFamily="66" charset="0"/>
+              </a:defRPr>
+            </a:lvl2pPr>
+            <a:lvl3pPr algn="l" rtl="0" eaLnBrk="0" fontAlgn="base" hangingPunct="0">
+              <a:spcBef>
+                <a:spcPct val="0"/>
+              </a:spcBef>
+              <a:spcAft>
+                <a:spcPct val="0"/>
+              </a:spcAft>
+              <a:defRPr sz="4400" b="1">
+                <a:solidFill>
+                  <a:schemeClr val="tx2"/>
+                </a:solidFill>
+                <a:latin typeface="Comic Sans MS" pitchFamily="66" charset="0"/>
+              </a:defRPr>
+            </a:lvl3pPr>
+            <a:lvl4pPr algn="l" rtl="0" eaLnBrk="0" fontAlgn="base" hangingPunct="0">
+              <a:spcBef>
+                <a:spcPct val="0"/>
+              </a:spcBef>
+              <a:spcAft>
+                <a:spcPct val="0"/>
+              </a:spcAft>
+              <a:defRPr sz="4400" b="1">
+                <a:solidFill>
+                  <a:schemeClr val="tx2"/>
+                </a:solidFill>
+                <a:latin typeface="Comic Sans MS" pitchFamily="66" charset="0"/>
+              </a:defRPr>
+            </a:lvl4pPr>
+            <a:lvl5pPr algn="l" rtl="0" eaLnBrk="0" fontAlgn="base" hangingPunct="0">
+              <a:spcBef>
+                <a:spcPct val="0"/>
+              </a:spcBef>
+              <a:spcAft>
+                <a:spcPct val="0"/>
+              </a:spcAft>
+              <a:defRPr sz="4400" b="1">
+                <a:solidFill>
+                  <a:schemeClr val="tx2"/>
+                </a:solidFill>
+                <a:latin typeface="Comic Sans MS" pitchFamily="66" charset="0"/>
+              </a:defRPr>
+            </a:lvl5pPr>
+            <a:lvl6pPr marL="457200" algn="l" rtl="0" fontAlgn="base">
+              <a:spcBef>
+                <a:spcPct val="0"/>
+              </a:spcBef>
+              <a:spcAft>
+                <a:spcPct val="0"/>
+              </a:spcAft>
+              <a:defRPr sz="4400" b="1">
+                <a:solidFill>
+                  <a:schemeClr val="tx2"/>
+                </a:solidFill>
+                <a:latin typeface="Times New Roman" pitchFamily="18" charset="0"/>
+              </a:defRPr>
+            </a:lvl6pPr>
+            <a:lvl7pPr marL="914400" algn="l" rtl="0" fontAlgn="base">
+              <a:spcBef>
+                <a:spcPct val="0"/>
+              </a:spcBef>
+              <a:spcAft>
+                <a:spcPct val="0"/>
+              </a:spcAft>
+              <a:defRPr sz="4400" b="1">
+                <a:solidFill>
+                  <a:schemeClr val="tx2"/>
+                </a:solidFill>
+                <a:latin typeface="Times New Roman" pitchFamily="18" charset="0"/>
+              </a:defRPr>
+            </a:lvl7pPr>
+            <a:lvl8pPr marL="1371600" algn="l" rtl="0" fontAlgn="base">
+              <a:spcBef>
+                <a:spcPct val="0"/>
+              </a:spcBef>
+              <a:spcAft>
+                <a:spcPct val="0"/>
+              </a:spcAft>
+              <a:defRPr sz="4400" b="1">
+                <a:solidFill>
+                  <a:schemeClr val="tx2"/>
+                </a:solidFill>
+                <a:latin typeface="Times New Roman" pitchFamily="18" charset="0"/>
+              </a:defRPr>
+            </a:lvl8pPr>
+            <a:lvl9pPr marL="1828800" algn="l" rtl="0" fontAlgn="base">
+              <a:spcBef>
+                <a:spcPct val="0"/>
+              </a:spcBef>
+              <a:spcAft>
+                <a:spcPct val="0"/>
+              </a:spcAft>
+              <a:defRPr sz="4400" b="1">
+                <a:solidFill>
+                  <a:schemeClr val="tx2"/>
+                </a:solidFill>
+                <a:latin typeface="Times New Roman" pitchFamily="18" charset="0"/>
+              </a:defRPr>
+            </a:lvl9pPr>
+          </a:lstStyle>
+          <a:p>
+            <a:pPr algn="ctr" eaLnBrk="1" hangingPunct="1"/>
+            <a:r>
+              <a:rPr lang="en-US" sz="3200" i="1" smtClean="0"/>
+              <a:t>Mathematics for Computer Science</a:t>
+            </a:r>
+            <a:r>
+              <a:rPr lang="en-US" i="1" smtClean="0"/>
+              <a:t/>
+            </a:r>
+            <a:br>
+              <a:rPr lang="en-US" i="1" smtClean="0"/>
+            </a:br>
+            <a:r>
+              <a:rPr lang="en-US" sz="3200" smtClean="0">
+                <a:solidFill>
+                  <a:srgbClr val="137117"/>
+                </a:solidFill>
+              </a:rPr>
+              <a:t>6.042J/18.062J</a:t>
+            </a:r>
+            <a:endParaRPr lang="en-US" sz="2800" dirty="0" smtClean="0">
+              <a:solidFill>
+                <a:srgbClr val="008380"/>
+              </a:solidFill>
+            </a:endParaRPr>
+          </a:p>
+        </p:txBody>
+      </p:sp>
     </p:spTree>
   </p:cSld>
   <p:clrMapOvr>
@@ -6179,7 +6368,7 @@
           <a:graphicData uri="http://schemas.openxmlformats.org/presentationml/2006/ole">
             <mc:AlternateContent xmlns:mc="http://schemas.openxmlformats.org/markup-compatibility/2006">
               <mc:Choice xmlns:v="urn:schemas-microsoft-com:vml" Requires="v">
-                <p:oleObj spid="_x0000_s406688" name="Equation" r:id="rId3" imgW="850900" imgH="241300" progId="Equation.DSMT4">
+                <p:oleObj spid="_x0000_s406693" name="Equation" r:id="rId3" imgW="850900" imgH="241300" progId="Equation.DSMT4">
                   <p:embed/>
                 </p:oleObj>
               </mc:Choice>
@@ -6236,7 +6425,7 @@
           <a:graphicData uri="http://schemas.openxmlformats.org/presentationml/2006/ole">
             <mc:AlternateContent xmlns:mc="http://schemas.openxmlformats.org/markup-compatibility/2006">
               <mc:Choice xmlns:v="urn:schemas-microsoft-com:vml" Requires="v">
-                <p:oleObj spid="_x0000_s406689" name="Equation" r:id="rId5" imgW="139700" imgH="215900" progId="Equation.DSMT4">
+                <p:oleObj spid="_x0000_s406694" name="Equation" r:id="rId5" imgW="139700" imgH="215900" progId="Equation.DSMT4">
                   <p:embed/>
                 </p:oleObj>
               </mc:Choice>
@@ -6293,7 +6482,7 @@
           <a:graphicData uri="http://schemas.openxmlformats.org/presentationml/2006/ole">
             <mc:AlternateContent xmlns:mc="http://schemas.openxmlformats.org/markup-compatibility/2006">
               <mc:Choice xmlns:v="urn:schemas-microsoft-com:vml" Requires="v">
-                <p:oleObj spid="_x0000_s406690" name="Equation" r:id="rId7" imgW="901700" imgH="241300" progId="Equation.DSMT4">
+                <p:oleObj spid="_x0000_s406695" name="Equation" r:id="rId7" imgW="901700" imgH="241300" progId="Equation.DSMT4">
                   <p:embed/>
                 </p:oleObj>
               </mc:Choice>
@@ -6391,7 +6580,7 @@
           <a:graphicData uri="http://schemas.openxmlformats.org/presentationml/2006/ole">
             <mc:AlternateContent xmlns:mc="http://schemas.openxmlformats.org/markup-compatibility/2006">
               <mc:Choice xmlns:v="urn:schemas-microsoft-com:vml" Requires="v">
-                <p:oleObj spid="_x0000_s406691" name="Equation" r:id="rId9" imgW="2209800" imgH="215900" progId="Equation.DSMT4">
+                <p:oleObj spid="_x0000_s406696" name="Equation" r:id="rId9" imgW="2209800" imgH="215900" progId="Equation.DSMT4">
                   <p:embed/>
                 </p:oleObj>
               </mc:Choice>
@@ -7522,7 +7711,7 @@
           <a:graphicData uri="http://schemas.openxmlformats.org/presentationml/2006/ole">
             <mc:AlternateContent xmlns:mc="http://schemas.openxmlformats.org/markup-compatibility/2006">
               <mc:Choice xmlns:v="urn:schemas-microsoft-com:vml" Requires="v">
-                <p:oleObj spid="_x0000_s409648" name="Equation" r:id="rId3" imgW="1854200" imgH="508000" progId="Equation.3">
+                <p:oleObj spid="_x0000_s409650" name="Equation" r:id="rId3" imgW="1854200" imgH="508000" progId="Equation.3">
                   <p:embed/>
                 </p:oleObj>
               </mc:Choice>
@@ -7879,7 +8068,7 @@
           <a:graphicData uri="http://schemas.openxmlformats.org/presentationml/2006/ole">
             <mc:AlternateContent xmlns:mc="http://schemas.openxmlformats.org/markup-compatibility/2006">
               <mc:Choice xmlns:v="urn:schemas-microsoft-com:vml" Requires="v">
-                <p:oleObj spid="_x0000_s408653" name="Equation" r:id="rId3" imgW="1854200" imgH="533400" progId="Equation.DSMT4">
+                <p:oleObj spid="_x0000_s408656" name="Equation" r:id="rId3" imgW="1854200" imgH="533400" progId="Equation.DSMT4">
                   <p:embed/>
                 </p:oleObj>
               </mc:Choice>
@@ -8030,7 +8219,7 @@
           <a:graphicData uri="http://schemas.openxmlformats.org/presentationml/2006/ole">
             <mc:AlternateContent xmlns:mc="http://schemas.openxmlformats.org/markup-compatibility/2006">
               <mc:Choice xmlns:v="urn:schemas-microsoft-com:vml" Requires="v">
-                <p:oleObj spid="_x0000_s408654" name="Equation" r:id="rId5" imgW="546100" imgH="241300" progId="Equation.DSMT4">
+                <p:oleObj spid="_x0000_s408657" name="Equation" r:id="rId5" imgW="546100" imgH="241300" progId="Equation.DSMT4">
                   <p:embed/>
                 </p:oleObj>
               </mc:Choice>
@@ -8305,7 +8494,7 @@
           <a:graphicData uri="http://schemas.openxmlformats.org/presentationml/2006/ole">
             <mc:AlternateContent xmlns:mc="http://schemas.openxmlformats.org/markup-compatibility/2006">
               <mc:Choice xmlns:v="urn:schemas-microsoft-com:vml" Requires="v">
-                <p:oleObj spid="_x0000_s410671" name="Equation" r:id="rId3" imgW="1955800" imgH="533400" progId="Equation.DSMT4">
+                <p:oleObj spid="_x0000_s410673" name="Equation" r:id="rId3" imgW="1955800" imgH="533400" progId="Equation.DSMT4">
                   <p:embed/>
                 </p:oleObj>
               </mc:Choice>
@@ -8836,7 +9025,7 @@
           <a:graphicData uri="http://schemas.openxmlformats.org/presentationml/2006/ole">
             <mc:AlternateContent xmlns:mc="http://schemas.openxmlformats.org/markup-compatibility/2006">
               <mc:Choice xmlns:v="urn:schemas-microsoft-com:vml" Requires="v">
-                <p:oleObj spid="_x0000_s411694" name="Equation" r:id="rId3" imgW="1955800" imgH="533400" progId="Equation.DSMT4">
+                <p:oleObj spid="_x0000_s411696" name="Equation" r:id="rId3" imgW="1955800" imgH="533400" progId="Equation.DSMT4">
                   <p:embed/>
                 </p:oleObj>
               </mc:Choice>
@@ -9149,7 +9338,7 @@
           <a:graphicData uri="http://schemas.openxmlformats.org/presentationml/2006/ole">
             <mc:AlternateContent xmlns:mc="http://schemas.openxmlformats.org/markup-compatibility/2006">
               <mc:Choice xmlns:v="urn:schemas-microsoft-com:vml" Requires="v">
-                <p:oleObj spid="_x0000_s412717" name="Equation" r:id="rId3" imgW="1955800" imgH="482600" progId="Equation.3">
+                <p:oleObj spid="_x0000_s412719" name="Equation" r:id="rId3" imgW="1955800" imgH="482600" progId="Equation.3">
                   <p:embed/>
                 </p:oleObj>
               </mc:Choice>
@@ -9594,7 +9783,7 @@
           <a:graphicData uri="http://schemas.openxmlformats.org/presentationml/2006/ole">
             <mc:AlternateContent xmlns:mc="http://schemas.openxmlformats.org/markup-compatibility/2006">
               <mc:Choice xmlns:v="urn:schemas-microsoft-com:vml" Requires="v">
-                <p:oleObj spid="_x0000_s413742" name="Equation" r:id="rId3" imgW="546100" imgH="215900" progId="Equation.DSMT4">
+                <p:oleObj spid="_x0000_s413744" name="Equation" r:id="rId3" imgW="546100" imgH="215900" progId="Equation.DSMT4">
                   <p:embed/>
                 </p:oleObj>
               </mc:Choice>
@@ -11883,7 +12072,7 @@
           <a:graphicData uri="http://schemas.openxmlformats.org/presentationml/2006/ole">
             <mc:AlternateContent xmlns:mc="http://schemas.openxmlformats.org/markup-compatibility/2006">
               <mc:Choice xmlns:v="urn:schemas-microsoft-com:vml" Requires="v">
-                <p:oleObj spid="_x0000_s418829" name="Equation" r:id="rId4" imgW="1790700" imgH="457200" progId="Equation.DSMT4">
+                <p:oleObj spid="_x0000_s418831" name="Equation" r:id="rId4" imgW="1790700" imgH="457200" progId="Equation.DSMT4">
                   <p:embed/>
                 </p:oleObj>
               </mc:Choice>
@@ -12179,7 +12368,7 @@
           <a:graphicData uri="http://schemas.openxmlformats.org/presentationml/2006/ole">
             <mc:AlternateContent xmlns:mc="http://schemas.openxmlformats.org/markup-compatibility/2006">
               <mc:Choice xmlns:v="urn:schemas-microsoft-com:vml" Requires="v">
-                <p:oleObj spid="_x0000_s419852" name="Equation" r:id="rId4" imgW="1498600" imgH="457200" progId="Equation.DSMT4">
+                <p:oleObj spid="_x0000_s419854" name="Equation" r:id="rId4" imgW="1498600" imgH="457200" progId="Equation.DSMT4">
                   <p:embed/>
                 </p:oleObj>
               </mc:Choice>

</xml_diff>